<commit_message>
Add image and text and figure
</commit_message>
<xml_diff>
--- a/figures/resources/workflow_cell_and_nuclei_segmentation.pptx
+++ b/figures/resources/workflow_cell_and_nuclei_segmentation.pptx
@@ -3481,8 +3481,8 @@
         </p:blipFill>
         <p:spPr>
           <a:xfrm>
-            <a:off x="1278591" y="1898277"/>
-            <a:ext cx="1028700" cy="990600"/>
+            <a:off x="82781" y="2393751"/>
+            <a:ext cx="2168936" cy="2088605"/>
           </a:xfrm>
           <a:prstGeom prst="rect">
             <a:avLst/>
@@ -3491,10 +3491,10 @@
       </p:pic>
       <p:pic>
         <p:nvPicPr>
-          <p:cNvPr id="5" name="Picture 4">
-            <a:extLst>
-              <a:ext uri="{FF2B5EF4-FFF2-40B4-BE49-F238E27FC236}">
-                <a16:creationId xmlns:a16="http://schemas.microsoft.com/office/drawing/2014/main" id="{8BC476DD-F0A0-1D4B-A1DD-73B71DA2CC51}"/>
+          <p:cNvPr id="6" name="Picture 5">
+            <a:extLst>
+              <a:ext uri="{FF2B5EF4-FFF2-40B4-BE49-F238E27FC236}">
+                <a16:creationId xmlns:a16="http://schemas.microsoft.com/office/drawing/2014/main" id="{880988E7-0A38-024F-A3CE-87E0C1F75BBE}"/>
               </a:ext>
             </a:extLst>
           </p:cNvPr>
@@ -3511,8 +3511,8 @@
         </p:blipFill>
         <p:spPr>
           <a:xfrm>
-            <a:off x="2475380" y="1898277"/>
-            <a:ext cx="1028700" cy="990600"/>
+            <a:off x="3682189" y="2393751"/>
+            <a:ext cx="2168936" cy="2088605"/>
           </a:xfrm>
           <a:prstGeom prst="rect">
             <a:avLst/>
@@ -3521,10 +3521,10 @@
       </p:pic>
       <p:pic>
         <p:nvPicPr>
-          <p:cNvPr id="6" name="Picture 5">
-            <a:extLst>
-              <a:ext uri="{FF2B5EF4-FFF2-40B4-BE49-F238E27FC236}">
-                <a16:creationId xmlns:a16="http://schemas.microsoft.com/office/drawing/2014/main" id="{880988E7-0A38-024F-A3CE-87E0C1F75BBE}"/>
+          <p:cNvPr id="7" name="Picture 6">
+            <a:extLst>
+              <a:ext uri="{FF2B5EF4-FFF2-40B4-BE49-F238E27FC236}">
+                <a16:creationId xmlns:a16="http://schemas.microsoft.com/office/drawing/2014/main" id="{5568928A-851F-7F42-8F78-3E9EF728DE90}"/>
               </a:ext>
             </a:extLst>
           </p:cNvPr>
@@ -3541,8 +3541,8 @@
         </p:blipFill>
         <p:spPr>
           <a:xfrm>
-            <a:off x="3672169" y="1898277"/>
-            <a:ext cx="1028700" cy="990600"/>
+            <a:off x="3682189" y="4693287"/>
+            <a:ext cx="2168936" cy="2088605"/>
           </a:xfrm>
           <a:prstGeom prst="rect">
             <a:avLst/>
@@ -3551,10 +3551,10 @@
       </p:pic>
       <p:pic>
         <p:nvPicPr>
-          <p:cNvPr id="7" name="Picture 6">
-            <a:extLst>
-              <a:ext uri="{FF2B5EF4-FFF2-40B4-BE49-F238E27FC236}">
-                <a16:creationId xmlns:a16="http://schemas.microsoft.com/office/drawing/2014/main" id="{5568928A-851F-7F42-8F78-3E9EF728DE90}"/>
+          <p:cNvPr id="8" name="Picture 7">
+            <a:extLst>
+              <a:ext uri="{FF2B5EF4-FFF2-40B4-BE49-F238E27FC236}">
+                <a16:creationId xmlns:a16="http://schemas.microsoft.com/office/drawing/2014/main" id="{BC1C22F6-D60A-F746-A3A4-C6A312FD1C30}"/>
               </a:ext>
             </a:extLst>
           </p:cNvPr>
@@ -3571,8 +3571,8 @@
         </p:blipFill>
         <p:spPr>
           <a:xfrm>
-            <a:off x="4868958" y="1898277"/>
-            <a:ext cx="1028700" cy="990600"/>
+            <a:off x="6772880" y="2382712"/>
+            <a:ext cx="2168936" cy="2088605"/>
           </a:xfrm>
           <a:prstGeom prst="rect">
             <a:avLst/>
@@ -3581,10 +3581,10 @@
       </p:pic>
       <p:pic>
         <p:nvPicPr>
-          <p:cNvPr id="8" name="Picture 7">
-            <a:extLst>
-              <a:ext uri="{FF2B5EF4-FFF2-40B4-BE49-F238E27FC236}">
-                <a16:creationId xmlns:a16="http://schemas.microsoft.com/office/drawing/2014/main" id="{BC1C22F6-D60A-F746-A3A4-C6A312FD1C30}"/>
+          <p:cNvPr id="9" name="Picture 8">
+            <a:extLst>
+              <a:ext uri="{FF2B5EF4-FFF2-40B4-BE49-F238E27FC236}">
+                <a16:creationId xmlns:a16="http://schemas.microsoft.com/office/drawing/2014/main" id="{7701269C-EB78-EC4F-B734-E9D1055467F9}"/>
               </a:ext>
             </a:extLst>
           </p:cNvPr>
@@ -3601,8 +3601,8 @@
         </p:blipFill>
         <p:spPr>
           <a:xfrm>
-            <a:off x="6065747" y="1898277"/>
-            <a:ext cx="1028700" cy="990600"/>
+            <a:off x="9935341" y="2382711"/>
+            <a:ext cx="2168936" cy="2088605"/>
           </a:xfrm>
           <a:prstGeom prst="rect">
             <a:avLst/>
@@ -3611,10 +3611,10 @@
       </p:pic>
       <p:pic>
         <p:nvPicPr>
-          <p:cNvPr id="9" name="Picture 8">
-            <a:extLst>
-              <a:ext uri="{FF2B5EF4-FFF2-40B4-BE49-F238E27FC236}">
-                <a16:creationId xmlns:a16="http://schemas.microsoft.com/office/drawing/2014/main" id="{7701269C-EB78-EC4F-B734-E9D1055467F9}"/>
+          <p:cNvPr id="10" name="Picture 9">
+            <a:extLst>
+              <a:ext uri="{FF2B5EF4-FFF2-40B4-BE49-F238E27FC236}">
+                <a16:creationId xmlns:a16="http://schemas.microsoft.com/office/drawing/2014/main" id="{373AACA6-E5E9-5C49-BBB9-DC2F98C35236}"/>
               </a:ext>
             </a:extLst>
           </p:cNvPr>
@@ -3631,14 +3631,734 @@
         </p:blipFill>
         <p:spPr>
           <a:xfrm>
-            <a:off x="7262536" y="1898277"/>
-            <a:ext cx="1028700" cy="990600"/>
+            <a:off x="3682189" y="94215"/>
+            <a:ext cx="2168936" cy="2088605"/>
           </a:xfrm>
           <a:prstGeom prst="rect">
             <a:avLst/>
           </a:prstGeom>
         </p:spPr>
       </p:pic>
+      <p:cxnSp>
+        <p:nvCxnSpPr>
+          <p:cNvPr id="12" name="Straight Arrow Connector 11">
+            <a:extLst>
+              <a:ext uri="{FF2B5EF4-FFF2-40B4-BE49-F238E27FC236}">
+                <a16:creationId xmlns:a16="http://schemas.microsoft.com/office/drawing/2014/main" id="{E7761039-7F66-8F47-A02E-F9888B831352}"/>
+              </a:ext>
+            </a:extLst>
+          </p:cNvPr>
+          <p:cNvCxnSpPr>
+            <a:cxnSpLocks/>
+          </p:cNvCxnSpPr>
+          <p:nvPr/>
+        </p:nvCxnSpPr>
+        <p:spPr>
+          <a:xfrm>
+            <a:off x="6011035" y="1224252"/>
+            <a:ext cx="638013" cy="1055729"/>
+          </a:xfrm>
+          <a:prstGeom prst="straightConnector1">
+            <a:avLst/>
+          </a:prstGeom>
+          <a:ln>
+            <a:solidFill>
+              <a:schemeClr val="tx1"/>
+            </a:solidFill>
+            <a:tailEnd type="triangle"/>
+          </a:ln>
+        </p:spPr>
+        <p:style>
+          <a:lnRef idx="1">
+            <a:schemeClr val="accent1"/>
+          </a:lnRef>
+          <a:fillRef idx="0">
+            <a:schemeClr val="accent1"/>
+          </a:fillRef>
+          <a:effectRef idx="0">
+            <a:schemeClr val="accent1"/>
+          </a:effectRef>
+          <a:fontRef idx="minor">
+            <a:schemeClr val="tx1"/>
+          </a:fontRef>
+        </p:style>
+      </p:cxnSp>
+      <p:cxnSp>
+        <p:nvCxnSpPr>
+          <p:cNvPr id="15" name="Straight Arrow Connector 14">
+            <a:extLst>
+              <a:ext uri="{FF2B5EF4-FFF2-40B4-BE49-F238E27FC236}">
+                <a16:creationId xmlns:a16="http://schemas.microsoft.com/office/drawing/2014/main" id="{65BF9D92-4902-584A-8EF0-2496A3F9123F}"/>
+              </a:ext>
+            </a:extLst>
+          </p:cNvPr>
+          <p:cNvCxnSpPr>
+            <a:cxnSpLocks/>
+          </p:cNvCxnSpPr>
+          <p:nvPr/>
+        </p:nvCxnSpPr>
+        <p:spPr>
+          <a:xfrm>
+            <a:off x="6039521" y="3411148"/>
+            <a:ext cx="609527" cy="0"/>
+          </a:xfrm>
+          <a:prstGeom prst="straightConnector1">
+            <a:avLst/>
+          </a:prstGeom>
+          <a:ln>
+            <a:solidFill>
+              <a:schemeClr val="tx1"/>
+            </a:solidFill>
+            <a:tailEnd type="triangle"/>
+          </a:ln>
+        </p:spPr>
+        <p:style>
+          <a:lnRef idx="1">
+            <a:schemeClr val="accent1"/>
+          </a:lnRef>
+          <a:fillRef idx="0">
+            <a:schemeClr val="accent1"/>
+          </a:fillRef>
+          <a:effectRef idx="0">
+            <a:schemeClr val="accent1"/>
+          </a:effectRef>
+          <a:fontRef idx="minor">
+            <a:schemeClr val="tx1"/>
+          </a:fontRef>
+        </p:style>
+      </p:cxnSp>
+      <p:cxnSp>
+        <p:nvCxnSpPr>
+          <p:cNvPr id="18" name="Straight Arrow Connector 17">
+            <a:extLst>
+              <a:ext uri="{FF2B5EF4-FFF2-40B4-BE49-F238E27FC236}">
+                <a16:creationId xmlns:a16="http://schemas.microsoft.com/office/drawing/2014/main" id="{6B81F5E3-6594-4645-8056-39201ACACCE2}"/>
+              </a:ext>
+            </a:extLst>
+          </p:cNvPr>
+          <p:cNvCxnSpPr>
+            <a:cxnSpLocks/>
+          </p:cNvCxnSpPr>
+          <p:nvPr/>
+        </p:nvCxnSpPr>
+        <p:spPr>
+          <a:xfrm flipV="1">
+            <a:off x="5976722" y="4647690"/>
+            <a:ext cx="672326" cy="1126577"/>
+          </a:xfrm>
+          <a:prstGeom prst="straightConnector1">
+            <a:avLst/>
+          </a:prstGeom>
+          <a:ln>
+            <a:solidFill>
+              <a:schemeClr val="tx1"/>
+            </a:solidFill>
+            <a:tailEnd type="triangle"/>
+          </a:ln>
+        </p:spPr>
+        <p:style>
+          <a:lnRef idx="1">
+            <a:schemeClr val="accent1"/>
+          </a:lnRef>
+          <a:fillRef idx="0">
+            <a:schemeClr val="accent1"/>
+          </a:fillRef>
+          <a:effectRef idx="0">
+            <a:schemeClr val="accent1"/>
+          </a:effectRef>
+          <a:fontRef idx="minor">
+            <a:schemeClr val="tx1"/>
+          </a:fontRef>
+        </p:style>
+      </p:cxnSp>
+      <p:sp>
+        <p:nvSpPr>
+          <p:cNvPr id="22" name="TextBox 21">
+            <a:extLst>
+              <a:ext uri="{FF2B5EF4-FFF2-40B4-BE49-F238E27FC236}">
+                <a16:creationId xmlns:a16="http://schemas.microsoft.com/office/drawing/2014/main" id="{6DC5785B-0E3A-EF4A-8D65-39F69DFC4604}"/>
+              </a:ext>
+            </a:extLst>
+          </p:cNvPr>
+          <p:cNvSpPr txBox="1"/>
+          <p:nvPr/>
+        </p:nvSpPr>
+        <p:spPr>
+          <a:xfrm>
+            <a:off x="6218447" y="1039586"/>
+            <a:ext cx="732893" cy="369332"/>
+          </a:xfrm>
+          <a:prstGeom prst="rect">
+            <a:avLst/>
+          </a:prstGeom>
+          <a:noFill/>
+        </p:spPr>
+        <p:txBody>
+          <a:bodyPr wrap="none" rtlCol="0">
+            <a:spAutoFit/>
+          </a:bodyPr>
+          <a:lstStyle/>
+          <a:p>
+            <a:r>
+              <a:rPr lang="de-DE" dirty="0" err="1"/>
+              <a:t>Seeds</a:t>
+            </a:r>
+            <a:endParaRPr lang="de-DE" dirty="0"/>
+          </a:p>
+        </p:txBody>
+      </p:sp>
+      <p:sp>
+        <p:nvSpPr>
+          <p:cNvPr id="23" name="TextBox 22">
+            <a:extLst>
+              <a:ext uri="{FF2B5EF4-FFF2-40B4-BE49-F238E27FC236}">
+                <a16:creationId xmlns:a16="http://schemas.microsoft.com/office/drawing/2014/main" id="{CBEEB4DA-C22A-5A40-B726-A7F7396D0DBC}"/>
+              </a:ext>
+            </a:extLst>
+          </p:cNvPr>
+          <p:cNvSpPr txBox="1"/>
+          <p:nvPr/>
+        </p:nvSpPr>
+        <p:spPr>
+          <a:xfrm>
+            <a:off x="6011035" y="2981632"/>
+            <a:ext cx="686406" cy="369332"/>
+          </a:xfrm>
+          <a:prstGeom prst="rect">
+            <a:avLst/>
+          </a:prstGeom>
+          <a:noFill/>
+        </p:spPr>
+        <p:txBody>
+          <a:bodyPr wrap="none" rtlCol="0">
+            <a:spAutoFit/>
+          </a:bodyPr>
+          <a:lstStyle/>
+          <a:p>
+            <a:r>
+              <a:rPr lang="de-DE" dirty="0" err="1"/>
+              <a:t>Mask</a:t>
+            </a:r>
+            <a:endParaRPr lang="de-DE" dirty="0"/>
+          </a:p>
+        </p:txBody>
+      </p:sp>
+      <p:sp>
+        <p:nvSpPr>
+          <p:cNvPr id="24" name="TextBox 23">
+            <a:extLst>
+              <a:ext uri="{FF2B5EF4-FFF2-40B4-BE49-F238E27FC236}">
+                <a16:creationId xmlns:a16="http://schemas.microsoft.com/office/drawing/2014/main" id="{D51F3CE0-8609-4549-A3E3-1520D973FCBC}"/>
+              </a:ext>
+            </a:extLst>
+          </p:cNvPr>
+          <p:cNvSpPr txBox="1"/>
+          <p:nvPr/>
+        </p:nvSpPr>
+        <p:spPr>
+          <a:xfrm>
+            <a:off x="6293422" y="5358715"/>
+            <a:ext cx="759823" cy="369332"/>
+          </a:xfrm>
+          <a:prstGeom prst="rect">
+            <a:avLst/>
+          </a:prstGeom>
+          <a:noFill/>
+        </p:spPr>
+        <p:txBody>
+          <a:bodyPr wrap="none" rtlCol="0">
+            <a:spAutoFit/>
+          </a:bodyPr>
+          <a:lstStyle/>
+          <a:p>
+            <a:r>
+              <a:rPr lang="de-DE" dirty="0"/>
+              <a:t>Image</a:t>
+            </a:r>
+          </a:p>
+        </p:txBody>
+      </p:sp>
+      <p:sp>
+        <p:nvSpPr>
+          <p:cNvPr id="25" name="TextBox 24">
+            <a:extLst>
+              <a:ext uri="{FF2B5EF4-FFF2-40B4-BE49-F238E27FC236}">
+                <a16:creationId xmlns:a16="http://schemas.microsoft.com/office/drawing/2014/main" id="{85C6030F-B5F6-0A47-8F4F-63295F62C1BC}"/>
+              </a:ext>
+            </a:extLst>
+          </p:cNvPr>
+          <p:cNvSpPr txBox="1"/>
+          <p:nvPr/>
+        </p:nvSpPr>
+        <p:spPr>
+          <a:xfrm>
+            <a:off x="7253632" y="1880723"/>
+            <a:ext cx="1205202" cy="369332"/>
+          </a:xfrm>
+          <a:prstGeom prst="rect">
+            <a:avLst/>
+          </a:prstGeom>
+          <a:noFill/>
+        </p:spPr>
+        <p:txBody>
+          <a:bodyPr wrap="none" rtlCol="0">
+            <a:spAutoFit/>
+          </a:bodyPr>
+          <a:lstStyle/>
+          <a:p>
+            <a:r>
+              <a:rPr lang="de-DE" dirty="0" err="1"/>
+              <a:t>Watershed</a:t>
+            </a:r>
+            <a:endParaRPr lang="de-DE" dirty="0"/>
+          </a:p>
+        </p:txBody>
+      </p:sp>
+      <p:sp>
+        <p:nvSpPr>
+          <p:cNvPr id="26" name="TextBox 25">
+            <a:extLst>
+              <a:ext uri="{FF2B5EF4-FFF2-40B4-BE49-F238E27FC236}">
+                <a16:creationId xmlns:a16="http://schemas.microsoft.com/office/drawing/2014/main" id="{A02FA589-9D25-0C4C-B2C5-53D0D2ADD1BE}"/>
+              </a:ext>
+            </a:extLst>
+          </p:cNvPr>
+          <p:cNvSpPr txBox="1"/>
+          <p:nvPr/>
+        </p:nvSpPr>
+        <p:spPr>
+          <a:xfrm>
+            <a:off x="10517083" y="1880723"/>
+            <a:ext cx="897875" cy="369332"/>
+          </a:xfrm>
+          <a:prstGeom prst="rect">
+            <a:avLst/>
+          </a:prstGeom>
+          <a:noFill/>
+        </p:spPr>
+        <p:txBody>
+          <a:bodyPr wrap="none" rtlCol="0">
+            <a:spAutoFit/>
+          </a:bodyPr>
+          <a:lstStyle/>
+          <a:p>
+            <a:r>
+              <a:rPr lang="de-DE" dirty="0" err="1"/>
+              <a:t>Overlay</a:t>
+            </a:r>
+            <a:endParaRPr lang="de-DE" dirty="0"/>
+          </a:p>
+        </p:txBody>
+      </p:sp>
+      <p:cxnSp>
+        <p:nvCxnSpPr>
+          <p:cNvPr id="30" name="Straight Arrow Connector 29">
+            <a:extLst>
+              <a:ext uri="{FF2B5EF4-FFF2-40B4-BE49-F238E27FC236}">
+                <a16:creationId xmlns:a16="http://schemas.microsoft.com/office/drawing/2014/main" id="{46BC63CF-DCC1-4642-82F3-895C9AAC05BA}"/>
+              </a:ext>
+            </a:extLst>
+          </p:cNvPr>
+          <p:cNvCxnSpPr>
+            <a:cxnSpLocks/>
+          </p:cNvCxnSpPr>
+          <p:nvPr/>
+        </p:nvCxnSpPr>
+        <p:spPr>
+          <a:xfrm>
+            <a:off x="9094586" y="3411148"/>
+            <a:ext cx="609527" cy="0"/>
+          </a:xfrm>
+          <a:prstGeom prst="straightConnector1">
+            <a:avLst/>
+          </a:prstGeom>
+          <a:ln>
+            <a:solidFill>
+              <a:schemeClr val="tx1"/>
+            </a:solidFill>
+            <a:tailEnd type="triangle"/>
+          </a:ln>
+        </p:spPr>
+        <p:style>
+          <a:lnRef idx="1">
+            <a:schemeClr val="accent1"/>
+          </a:lnRef>
+          <a:fillRef idx="0">
+            <a:schemeClr val="accent1"/>
+          </a:fillRef>
+          <a:effectRef idx="0">
+            <a:schemeClr val="accent1"/>
+          </a:effectRef>
+          <a:fontRef idx="minor">
+            <a:schemeClr val="tx1"/>
+          </a:fontRef>
+        </p:style>
+      </p:cxnSp>
+      <p:sp>
+        <p:nvSpPr>
+          <p:cNvPr id="31" name="TextBox 30">
+            <a:extLst>
+              <a:ext uri="{FF2B5EF4-FFF2-40B4-BE49-F238E27FC236}">
+                <a16:creationId xmlns:a16="http://schemas.microsoft.com/office/drawing/2014/main" id="{AB567B7A-DC4C-6543-BD75-9415E80BCA62}"/>
+              </a:ext>
+            </a:extLst>
+          </p:cNvPr>
+          <p:cNvSpPr txBox="1"/>
+          <p:nvPr/>
+        </p:nvSpPr>
+        <p:spPr>
+          <a:xfrm>
+            <a:off x="8968338" y="2438487"/>
+            <a:ext cx="996491" cy="923330"/>
+          </a:xfrm>
+          <a:prstGeom prst="rect">
+            <a:avLst/>
+          </a:prstGeom>
+          <a:noFill/>
+        </p:spPr>
+        <p:txBody>
+          <a:bodyPr wrap="none" rtlCol="0">
+            <a:spAutoFit/>
+          </a:bodyPr>
+          <a:lstStyle/>
+          <a:p>
+            <a:r>
+              <a:rPr lang="de-DE" dirty="0"/>
+              <a:t>Remove </a:t>
+            </a:r>
+          </a:p>
+          <a:p>
+            <a:r>
+              <a:rPr lang="de-DE" dirty="0" err="1"/>
+              <a:t>border</a:t>
+            </a:r>
+            <a:endParaRPr lang="de-DE" dirty="0"/>
+          </a:p>
+          <a:p>
+            <a:r>
+              <a:rPr lang="de-DE" dirty="0" err="1"/>
+              <a:t>labels</a:t>
+            </a:r>
+            <a:endParaRPr lang="de-DE" dirty="0"/>
+          </a:p>
+        </p:txBody>
+      </p:sp>
+      <p:sp>
+        <p:nvSpPr>
+          <p:cNvPr id="32" name="TextBox 31">
+            <a:extLst>
+              <a:ext uri="{FF2B5EF4-FFF2-40B4-BE49-F238E27FC236}">
+                <a16:creationId xmlns:a16="http://schemas.microsoft.com/office/drawing/2014/main" id="{4A88BF2F-464B-E04F-9A3E-D0EBB9E3446B}"/>
+              </a:ext>
+            </a:extLst>
+          </p:cNvPr>
+          <p:cNvSpPr txBox="1"/>
+          <p:nvPr/>
+        </p:nvSpPr>
+        <p:spPr>
+          <a:xfrm>
+            <a:off x="1247491" y="554979"/>
+            <a:ext cx="1642566" cy="1200329"/>
+          </a:xfrm>
+          <a:prstGeom prst="rect">
+            <a:avLst/>
+          </a:prstGeom>
+          <a:noFill/>
+        </p:spPr>
+        <p:txBody>
+          <a:bodyPr wrap="none" rtlCol="0">
+            <a:spAutoFit/>
+          </a:bodyPr>
+          <a:lstStyle/>
+          <a:p>
+            <a:pPr marL="285750" indent="-285750">
+              <a:buFontTx/>
+              <a:buChar char="-"/>
+            </a:pPr>
+            <a:r>
+              <a:rPr lang="de-DE" dirty="0">
+                <a:solidFill>
+                  <a:srgbClr val="D644D8"/>
+                </a:solidFill>
+              </a:rPr>
+              <a:t>Smooth</a:t>
+            </a:r>
+          </a:p>
+          <a:p>
+            <a:pPr marL="285750" indent="-285750">
+              <a:buFontTx/>
+              <a:buChar char="-"/>
+            </a:pPr>
+            <a:r>
+              <a:rPr lang="de-DE" dirty="0" err="1"/>
+              <a:t>Threshold</a:t>
+            </a:r>
+            <a:endParaRPr lang="de-DE" dirty="0"/>
+          </a:p>
+          <a:p>
+            <a:pPr marL="285750" indent="-285750">
+              <a:buFontTx/>
+              <a:buChar char="-"/>
+            </a:pPr>
+            <a:r>
+              <a:rPr lang="de-DE" dirty="0" err="1"/>
+              <a:t>Connected</a:t>
+            </a:r>
+            <a:r>
+              <a:rPr lang="de-DE" dirty="0"/>
+              <a:t> </a:t>
+            </a:r>
+            <a:br>
+              <a:rPr lang="de-DE" dirty="0"/>
+            </a:br>
+            <a:r>
+              <a:rPr lang="de-DE" dirty="0" err="1"/>
+              <a:t>components</a:t>
+            </a:r>
+            <a:endParaRPr lang="de-DE" dirty="0"/>
+          </a:p>
+        </p:txBody>
+      </p:sp>
+      <p:cxnSp>
+        <p:nvCxnSpPr>
+          <p:cNvPr id="33" name="Straight Arrow Connector 32">
+            <a:extLst>
+              <a:ext uri="{FF2B5EF4-FFF2-40B4-BE49-F238E27FC236}">
+                <a16:creationId xmlns:a16="http://schemas.microsoft.com/office/drawing/2014/main" id="{6706E9AD-1D1D-DE4A-8676-038B81C78DD9}"/>
+              </a:ext>
+            </a:extLst>
+          </p:cNvPr>
+          <p:cNvCxnSpPr>
+            <a:cxnSpLocks/>
+          </p:cNvCxnSpPr>
+          <p:nvPr/>
+        </p:nvCxnSpPr>
+        <p:spPr>
+          <a:xfrm flipV="1">
+            <a:off x="2372740" y="1224252"/>
+            <a:ext cx="1059072" cy="1025803"/>
+          </a:xfrm>
+          <a:prstGeom prst="straightConnector1">
+            <a:avLst/>
+          </a:prstGeom>
+          <a:ln>
+            <a:solidFill>
+              <a:schemeClr val="tx1"/>
+            </a:solidFill>
+            <a:tailEnd type="triangle"/>
+          </a:ln>
+        </p:spPr>
+        <p:style>
+          <a:lnRef idx="1">
+            <a:schemeClr val="accent1"/>
+          </a:lnRef>
+          <a:fillRef idx="0">
+            <a:schemeClr val="accent1"/>
+          </a:fillRef>
+          <a:effectRef idx="0">
+            <a:schemeClr val="accent1"/>
+          </a:effectRef>
+          <a:fontRef idx="minor">
+            <a:schemeClr val="tx1"/>
+          </a:fontRef>
+        </p:style>
+      </p:cxnSp>
+      <p:cxnSp>
+        <p:nvCxnSpPr>
+          <p:cNvPr id="39" name="Straight Arrow Connector 38">
+            <a:extLst>
+              <a:ext uri="{FF2B5EF4-FFF2-40B4-BE49-F238E27FC236}">
+                <a16:creationId xmlns:a16="http://schemas.microsoft.com/office/drawing/2014/main" id="{CB04BF4D-C742-E94D-8341-C263B5F9A3A3}"/>
+              </a:ext>
+            </a:extLst>
+          </p:cNvPr>
+          <p:cNvCxnSpPr>
+            <a:cxnSpLocks/>
+          </p:cNvCxnSpPr>
+          <p:nvPr/>
+        </p:nvCxnSpPr>
+        <p:spPr>
+          <a:xfrm flipV="1">
+            <a:off x="2446940" y="3411148"/>
+            <a:ext cx="997091" cy="1"/>
+          </a:xfrm>
+          <a:prstGeom prst="straightConnector1">
+            <a:avLst/>
+          </a:prstGeom>
+          <a:ln>
+            <a:solidFill>
+              <a:schemeClr val="tx1"/>
+            </a:solidFill>
+            <a:tailEnd type="triangle"/>
+          </a:ln>
+        </p:spPr>
+        <p:style>
+          <a:lnRef idx="1">
+            <a:schemeClr val="accent1"/>
+          </a:lnRef>
+          <a:fillRef idx="0">
+            <a:schemeClr val="accent1"/>
+          </a:fillRef>
+          <a:effectRef idx="0">
+            <a:schemeClr val="accent1"/>
+          </a:effectRef>
+          <a:fontRef idx="minor">
+            <a:schemeClr val="tx1"/>
+          </a:fontRef>
+        </p:style>
+      </p:cxnSp>
+      <p:sp>
+        <p:nvSpPr>
+          <p:cNvPr id="42" name="TextBox 41">
+            <a:extLst>
+              <a:ext uri="{FF2B5EF4-FFF2-40B4-BE49-F238E27FC236}">
+                <a16:creationId xmlns:a16="http://schemas.microsoft.com/office/drawing/2014/main" id="{D72F9848-8F97-7542-A61E-7A74E3994C2A}"/>
+              </a:ext>
+            </a:extLst>
+          </p:cNvPr>
+          <p:cNvSpPr txBox="1"/>
+          <p:nvPr/>
+        </p:nvSpPr>
+        <p:spPr>
+          <a:xfrm>
+            <a:off x="2309292" y="2685129"/>
+            <a:ext cx="1407950" cy="646331"/>
+          </a:xfrm>
+          <a:prstGeom prst="rect">
+            <a:avLst/>
+          </a:prstGeom>
+          <a:noFill/>
+        </p:spPr>
+        <p:txBody>
+          <a:bodyPr wrap="none" rtlCol="0">
+            <a:spAutoFit/>
+          </a:bodyPr>
+          <a:lstStyle/>
+          <a:p>
+            <a:pPr marL="285750" indent="-285750">
+              <a:buFontTx/>
+              <a:buChar char="-"/>
+            </a:pPr>
+            <a:r>
+              <a:rPr lang="de-DE" dirty="0">
+                <a:solidFill>
+                  <a:srgbClr val="0EC90B"/>
+                </a:solidFill>
+              </a:rPr>
+              <a:t>Smooth</a:t>
+            </a:r>
+          </a:p>
+          <a:p>
+            <a:pPr marL="285750" indent="-285750">
+              <a:buFontTx/>
+              <a:buChar char="-"/>
+            </a:pPr>
+            <a:r>
+              <a:rPr lang="de-DE" dirty="0" err="1"/>
+              <a:t>Threshold</a:t>
+            </a:r>
+            <a:endParaRPr lang="de-DE" dirty="0"/>
+          </a:p>
+        </p:txBody>
+      </p:sp>
+      <p:cxnSp>
+        <p:nvCxnSpPr>
+          <p:cNvPr id="43" name="Straight Arrow Connector 42">
+            <a:extLst>
+              <a:ext uri="{FF2B5EF4-FFF2-40B4-BE49-F238E27FC236}">
+                <a16:creationId xmlns:a16="http://schemas.microsoft.com/office/drawing/2014/main" id="{F9CFD27D-3B4D-5342-B467-C07E5B120BD7}"/>
+              </a:ext>
+            </a:extLst>
+          </p:cNvPr>
+          <p:cNvCxnSpPr>
+            <a:cxnSpLocks/>
+          </p:cNvCxnSpPr>
+          <p:nvPr/>
+        </p:nvCxnSpPr>
+        <p:spPr>
+          <a:xfrm>
+            <a:off x="2309292" y="4647690"/>
+            <a:ext cx="1122520" cy="1024953"/>
+          </a:xfrm>
+          <a:prstGeom prst="straightConnector1">
+            <a:avLst/>
+          </a:prstGeom>
+          <a:ln>
+            <a:solidFill>
+              <a:schemeClr val="tx1"/>
+            </a:solidFill>
+            <a:tailEnd type="triangle"/>
+          </a:ln>
+        </p:spPr>
+        <p:style>
+          <a:lnRef idx="1">
+            <a:schemeClr val="accent1"/>
+          </a:lnRef>
+          <a:fillRef idx="0">
+            <a:schemeClr val="accent1"/>
+          </a:fillRef>
+          <a:effectRef idx="0">
+            <a:schemeClr val="accent1"/>
+          </a:effectRef>
+          <a:fontRef idx="minor">
+            <a:schemeClr val="tx1"/>
+          </a:fontRef>
+        </p:style>
+      </p:cxnSp>
+      <p:sp>
+        <p:nvSpPr>
+          <p:cNvPr id="49" name="TextBox 48">
+            <a:extLst>
+              <a:ext uri="{FF2B5EF4-FFF2-40B4-BE49-F238E27FC236}">
+                <a16:creationId xmlns:a16="http://schemas.microsoft.com/office/drawing/2014/main" id="{00EFD49E-89FF-1B4D-8FCC-7461821609DA}"/>
+              </a:ext>
+            </a:extLst>
+          </p:cNvPr>
+          <p:cNvSpPr txBox="1"/>
+          <p:nvPr/>
+        </p:nvSpPr>
+        <p:spPr>
+          <a:xfrm>
+            <a:off x="1583666" y="5127936"/>
+            <a:ext cx="1258678" cy="646331"/>
+          </a:xfrm>
+          <a:prstGeom prst="rect">
+            <a:avLst/>
+          </a:prstGeom>
+          <a:noFill/>
+        </p:spPr>
+        <p:txBody>
+          <a:bodyPr wrap="none" rtlCol="0">
+            <a:spAutoFit/>
+          </a:bodyPr>
+          <a:lstStyle/>
+          <a:p>
+            <a:pPr marL="285750" indent="-285750">
+              <a:buFontTx/>
+              <a:buChar char="-"/>
+            </a:pPr>
+            <a:r>
+              <a:rPr lang="de-DE" dirty="0">
+                <a:solidFill>
+                  <a:srgbClr val="0EC90B"/>
+                </a:solidFill>
+              </a:rPr>
+              <a:t>Smooth </a:t>
+            </a:r>
+          </a:p>
+          <a:p>
+            <a:pPr marL="285750" indent="-285750">
+              <a:buFontTx/>
+              <a:buChar char="-"/>
+            </a:pPr>
+            <a:r>
+              <a:rPr lang="de-DE" dirty="0" err="1"/>
+              <a:t>Invert</a:t>
+            </a:r>
+            <a:endParaRPr lang="de-DE" dirty="0"/>
+          </a:p>
+        </p:txBody>
+      </p:sp>
     </p:spTree>
     <p:extLst>
       <p:ext uri="{BB962C8B-B14F-4D97-AF65-F5344CB8AC3E}">

</xml_diff>